<commit_message>
Faltaba gráfica de LXC
</commit_message>
<xml_diff>
--- a/Presentación David-P4.pptx
+++ b/Presentación David-P4.pptx
@@ -12,8 +12,8 @@
     <p:sldId id="271" r:id="rId3"/>
     <p:sldId id="313" r:id="rId4"/>
     <p:sldId id="359" r:id="rId5"/>
-    <p:sldId id="360" r:id="rId6"/>
-    <p:sldId id="361" r:id="rId7"/>
+    <p:sldId id="361" r:id="rId6"/>
+    <p:sldId id="360" r:id="rId7"/>
     <p:sldId id="341" r:id="rId8"/>
     <p:sldId id="362" r:id="rId9"/>
     <p:sldId id="367" r:id="rId10"/>
@@ -144,6 +144,577 @@
 </file>
 
 <file path=ppt/charts/chart1.xml><?xml version="1.0" encoding="utf-8"?>
+<c:chartSpace xmlns:c="http://schemas.openxmlformats.org/drawingml/2006/chart" xmlns:a="http://schemas.openxmlformats.org/drawingml/2006/main" xmlns:r="http://schemas.openxmlformats.org/officeDocument/2006/relationships" xmlns:c16r2="http://schemas.microsoft.com/office/drawing/2015/06/chart">
+  <c:date1904 val="0"/>
+  <c:lang val="en-US"/>
+  <c:roundedCorners val="0"/>
+  <mc:AlternateContent xmlns:mc="http://schemas.openxmlformats.org/markup-compatibility/2006">
+    <mc:Choice xmlns:c14="http://schemas.microsoft.com/office/drawing/2007/8/2/chart" Requires="c14">
+      <c14:style val="102"/>
+    </mc:Choice>
+    <mc:Fallback>
+      <c:style val="2"/>
+    </mc:Fallback>
+  </mc:AlternateContent>
+  <c:chart>
+    <c:title>
+      <c:tx>
+        <c:rich>
+          <a:bodyPr rot="0" spcFirstLastPara="1" vertOverflow="ellipsis" vert="horz" wrap="square" anchor="ctr" anchorCtr="1"/>
+          <a:lstStyle/>
+          <a:p>
+            <a:pPr>
+              <a:defRPr sz="1400" b="0" i="0" u="none" strike="noStrike" kern="1200" spc="0" baseline="0">
+                <a:solidFill>
+                  <a:schemeClr val="tx1">
+                    <a:lumMod val="65000"/>
+                    <a:lumOff val="35000"/>
+                  </a:schemeClr>
+                </a:solidFill>
+                <a:latin typeface="+mn-lt"/>
+                <a:ea typeface="+mn-ea"/>
+                <a:cs typeface="+mn-cs"/>
+              </a:defRPr>
+            </a:pPr>
+            <a:r>
+              <a:rPr lang="es-ES" baseline="0" dirty="0"/>
+              <a:t>Nativo vs LXC</a:t>
+            </a:r>
+            <a:endParaRPr lang="es-ES" dirty="0"/>
+          </a:p>
+        </c:rich>
+      </c:tx>
+      <c:overlay val="0"/>
+      <c:spPr>
+        <a:noFill/>
+        <a:ln>
+          <a:noFill/>
+        </a:ln>
+        <a:effectLst/>
+      </c:spPr>
+      <c:txPr>
+        <a:bodyPr rot="0" spcFirstLastPara="1" vertOverflow="ellipsis" vert="horz" wrap="square" anchor="ctr" anchorCtr="1"/>
+        <a:lstStyle/>
+        <a:p>
+          <a:pPr>
+            <a:defRPr sz="1400" b="0" i="0" u="none" strike="noStrike" kern="1200" spc="0" baseline="0">
+              <a:solidFill>
+                <a:schemeClr val="tx1">
+                  <a:lumMod val="65000"/>
+                  <a:lumOff val="35000"/>
+                </a:schemeClr>
+              </a:solidFill>
+              <a:latin typeface="+mn-lt"/>
+              <a:ea typeface="+mn-ea"/>
+              <a:cs typeface="+mn-cs"/>
+            </a:defRPr>
+          </a:pPr>
+          <a:endParaRPr lang="es-ES"/>
+        </a:p>
+      </c:txPr>
+    </c:title>
+    <c:autoTitleDeleted val="0"/>
+    <c:plotArea>
+      <c:layout/>
+      <c:barChart>
+        <c:barDir val="col"/>
+        <c:grouping val="clustered"/>
+        <c:varyColors val="0"/>
+        <c:ser>
+          <c:idx val="1"/>
+          <c:order val="1"/>
+          <c:tx>
+            <c:strRef>
+              <c:f>Jbb!$C$66</c:f>
+              <c:strCache>
+                <c:ptCount val="1"/>
+                <c:pt idx="0">
+                  <c:v>jdk 1.7</c:v>
+                </c:pt>
+              </c:strCache>
+            </c:strRef>
+          </c:tx>
+          <c:spPr>
+            <a:solidFill>
+              <a:schemeClr val="accent2"/>
+            </a:solidFill>
+            <a:ln>
+              <a:noFill/>
+            </a:ln>
+            <a:effectLst/>
+          </c:spPr>
+          <c:invertIfNegative val="0"/>
+          <c:dLbls>
+            <c:spPr>
+              <a:noFill/>
+              <a:ln>
+                <a:noFill/>
+              </a:ln>
+              <a:effectLst/>
+            </c:spPr>
+            <c:txPr>
+              <a:bodyPr rot="0" spcFirstLastPara="1" vertOverflow="ellipsis" vert="horz" wrap="square" lIns="38100" tIns="19050" rIns="38100" bIns="19050" anchor="ctr" anchorCtr="1">
+                <a:spAutoFit/>
+              </a:bodyPr>
+              <a:lstStyle/>
+              <a:p>
+                <a:pPr>
+                  <a:defRPr sz="900" b="0" i="0" u="none" strike="noStrike" kern="1200" baseline="0">
+                    <a:solidFill>
+                      <a:schemeClr val="tx1">
+                        <a:lumMod val="75000"/>
+                        <a:lumOff val="25000"/>
+                      </a:schemeClr>
+                    </a:solidFill>
+                    <a:latin typeface="+mn-lt"/>
+                    <a:ea typeface="+mn-ea"/>
+                    <a:cs typeface="+mn-cs"/>
+                  </a:defRPr>
+                </a:pPr>
+                <a:endParaRPr lang="es-ES"/>
+              </a:p>
+            </c:txPr>
+            <c:showLegendKey val="0"/>
+            <c:showVal val="1"/>
+            <c:showCatName val="0"/>
+            <c:showSerName val="0"/>
+            <c:showPercent val="0"/>
+            <c:showBubbleSize val="0"/>
+            <c:showLeaderLines val="0"/>
+            <c:extLst>
+              <c:ext xmlns:c15="http://schemas.microsoft.com/office/drawing/2012/chart" uri="{CE6537A1-D6FC-4f65-9D91-7224C49458BB}">
+                <c15:showLeaderLines val="1"/>
+                <c15:leaderLines>
+                  <c:spPr>
+                    <a:ln w="9525" cap="flat" cmpd="sng" algn="ctr">
+                      <a:solidFill>
+                        <a:schemeClr val="tx1">
+                          <a:lumMod val="35000"/>
+                          <a:lumOff val="65000"/>
+                        </a:schemeClr>
+                      </a:solidFill>
+                      <a:round/>
+                    </a:ln>
+                    <a:effectLst/>
+                  </c:spPr>
+                </c15:leaderLines>
+              </c:ext>
+            </c:extLst>
+          </c:dLbls>
+          <c:val>
+            <c:numRef>
+              <c:f>Jbb!$C$67:$C$72</c:f>
+              <c:numCache>
+                <c:formatCode>General</c:formatCode>
+                <c:ptCount val="6"/>
+                <c:pt idx="0">
+                  <c:v>67369</c:v>
+                </c:pt>
+                <c:pt idx="1">
+                  <c:v>140749</c:v>
+                </c:pt>
+                <c:pt idx="2">
+                  <c:v>188739</c:v>
+                </c:pt>
+                <c:pt idx="3">
+                  <c:v>218448</c:v>
+                </c:pt>
+                <c:pt idx="4">
+                  <c:v>212553</c:v>
+                </c:pt>
+                <c:pt idx="5">
+                  <c:v>204490</c:v>
+                </c:pt>
+              </c:numCache>
+            </c:numRef>
+          </c:val>
+          <c:extLst>
+            <c:ext xmlns:c16="http://schemas.microsoft.com/office/drawing/2014/chart" uri="{C3380CC4-5D6E-409C-BE32-E72D297353CC}">
+              <c16:uniqueId val="{00000000-73FE-453F-9405-7BD303270744}"/>
+            </c:ext>
+          </c:extLst>
+        </c:ser>
+        <c:ser>
+          <c:idx val="2"/>
+          <c:order val="2"/>
+          <c:tx>
+            <c:strRef>
+              <c:f>Jbb!$D$66</c:f>
+              <c:strCache>
+                <c:ptCount val="1"/>
+                <c:pt idx="0">
+                  <c:v>HVMx2</c:v>
+                </c:pt>
+              </c:strCache>
+            </c:strRef>
+          </c:tx>
+          <c:spPr>
+            <a:solidFill>
+              <a:schemeClr val="accent3"/>
+            </a:solidFill>
+            <a:ln>
+              <a:noFill/>
+            </a:ln>
+            <a:effectLst/>
+          </c:spPr>
+          <c:invertIfNegative val="0"/>
+          <c:val>
+            <c:numRef>
+              <c:f>Jbb!$D$67:$D$72</c:f>
+            </c:numRef>
+          </c:val>
+          <c:extLst>
+            <c:ext xmlns:c16="http://schemas.microsoft.com/office/drawing/2014/chart" uri="{C3380CC4-5D6E-409C-BE32-E72D297353CC}">
+              <c16:uniqueId val="{00000001-73FE-453F-9405-7BD303270744}"/>
+            </c:ext>
+          </c:extLst>
+        </c:ser>
+        <c:ser>
+          <c:idx val="3"/>
+          <c:order val="3"/>
+          <c:tx>
+            <c:strRef>
+              <c:f>Jbb!$E$66</c:f>
+              <c:strCache>
+                <c:ptCount val="1"/>
+                <c:pt idx="0">
+                  <c:v>Dockerx2</c:v>
+                </c:pt>
+              </c:strCache>
+            </c:strRef>
+          </c:tx>
+          <c:spPr>
+            <a:solidFill>
+              <a:schemeClr val="accent4"/>
+            </a:solidFill>
+            <a:ln>
+              <a:noFill/>
+            </a:ln>
+            <a:effectLst/>
+          </c:spPr>
+          <c:invertIfNegative val="0"/>
+          <c:dLbls>
+            <c:spPr>
+              <a:noFill/>
+              <a:ln>
+                <a:noFill/>
+              </a:ln>
+              <a:effectLst/>
+            </c:spPr>
+            <c:txPr>
+              <a:bodyPr rot="0" spcFirstLastPara="1" vertOverflow="ellipsis" vert="horz" wrap="square" lIns="38100" tIns="19050" rIns="38100" bIns="19050" anchor="ctr" anchorCtr="1">
+                <a:spAutoFit/>
+              </a:bodyPr>
+              <a:lstStyle/>
+              <a:p>
+                <a:pPr>
+                  <a:defRPr sz="900" b="0" i="0" u="none" strike="noStrike" kern="1200" baseline="0">
+                    <a:solidFill>
+                      <a:schemeClr val="tx1">
+                        <a:lumMod val="75000"/>
+                        <a:lumOff val="25000"/>
+                      </a:schemeClr>
+                    </a:solidFill>
+                    <a:latin typeface="+mn-lt"/>
+                    <a:ea typeface="+mn-ea"/>
+                    <a:cs typeface="+mn-cs"/>
+                  </a:defRPr>
+                </a:pPr>
+                <a:endParaRPr lang="es-ES"/>
+              </a:p>
+            </c:txPr>
+            <c:showLegendKey val="0"/>
+            <c:showVal val="1"/>
+            <c:showCatName val="0"/>
+            <c:showSerName val="0"/>
+            <c:showPercent val="0"/>
+            <c:showBubbleSize val="0"/>
+            <c:showLeaderLines val="0"/>
+            <c:extLst>
+              <c:ext xmlns:c15="http://schemas.microsoft.com/office/drawing/2012/chart" uri="{CE6537A1-D6FC-4f65-9D91-7224C49458BB}">
+                <c15:showLeaderLines val="1"/>
+                <c15:leaderLines>
+                  <c:spPr>
+                    <a:ln w="9525" cap="flat" cmpd="sng" algn="ctr">
+                      <a:solidFill>
+                        <a:schemeClr val="tx1">
+                          <a:lumMod val="35000"/>
+                          <a:lumOff val="65000"/>
+                        </a:schemeClr>
+                      </a:solidFill>
+                      <a:round/>
+                    </a:ln>
+                    <a:effectLst/>
+                  </c:spPr>
+                </c15:leaderLines>
+              </c:ext>
+            </c:extLst>
+          </c:dLbls>
+          <c:val>
+            <c:numRef>
+              <c:f>Jbb!$E$67:$E$72</c:f>
+              <c:numCache>
+                <c:formatCode>General</c:formatCode>
+                <c:ptCount val="6"/>
+                <c:pt idx="0">
+                  <c:v>65581</c:v>
+                </c:pt>
+                <c:pt idx="1">
+                  <c:v>124740</c:v>
+                </c:pt>
+                <c:pt idx="2">
+                  <c:v>165832</c:v>
+                </c:pt>
+                <c:pt idx="3">
+                  <c:v>157123</c:v>
+                </c:pt>
+                <c:pt idx="4">
+                  <c:v>147377</c:v>
+                </c:pt>
+                <c:pt idx="5">
+                  <c:v>143157</c:v>
+                </c:pt>
+              </c:numCache>
+            </c:numRef>
+          </c:val>
+          <c:extLst>
+            <c:ext xmlns:c16="http://schemas.microsoft.com/office/drawing/2014/chart" uri="{C3380CC4-5D6E-409C-BE32-E72D297353CC}">
+              <c16:uniqueId val="{00000002-73FE-453F-9405-7BD303270744}"/>
+            </c:ext>
+          </c:extLst>
+        </c:ser>
+        <c:dLbls>
+          <c:showLegendKey val="0"/>
+          <c:showVal val="0"/>
+          <c:showCatName val="0"/>
+          <c:showSerName val="0"/>
+          <c:showPercent val="0"/>
+          <c:showBubbleSize val="0"/>
+        </c:dLbls>
+        <c:gapWidth val="219"/>
+        <c:overlap val="-27"/>
+        <c:axId val="349506480"/>
+        <c:axId val="349507792"/>
+        <c:extLst>
+          <c:ext xmlns:c15="http://schemas.microsoft.com/office/drawing/2012/chart" uri="{02D57815-91ED-43cb-92C2-25804820EDAC}">
+            <c15:filteredBarSeries>
+              <c15:ser>
+                <c:idx val="0"/>
+                <c:order val="0"/>
+                <c:tx>
+                  <c:strRef>
+                    <c:extLst>
+                      <c:ext uri="{02D57815-91ED-43cb-92C2-25804820EDAC}">
+                        <c15:formulaRef>
+                          <c15:sqref>Jbb!$B$66</c15:sqref>
+                        </c15:formulaRef>
+                      </c:ext>
+                    </c:extLst>
+                    <c:strCache>
+                      <c:ptCount val="1"/>
+                      <c:pt idx="0">
+                        <c:v>Warehouses</c:v>
+                      </c:pt>
+                    </c:strCache>
+                  </c:strRef>
+                </c:tx>
+                <c:spPr>
+                  <a:solidFill>
+                    <a:schemeClr val="accent1"/>
+                  </a:solidFill>
+                  <a:ln>
+                    <a:noFill/>
+                  </a:ln>
+                  <a:effectLst/>
+                </c:spPr>
+                <c:invertIfNegative val="0"/>
+                <c:val>
+                  <c:numRef>
+                    <c:extLst>
+                      <c:ext uri="{02D57815-91ED-43cb-92C2-25804820EDAC}">
+                        <c15:formulaRef>
+                          <c15:sqref>Jbb!$B$67:$B$72</c15:sqref>
+                        </c15:formulaRef>
+                      </c:ext>
+                    </c:extLst>
+                    <c:numCache>
+                      <c:formatCode>General</c:formatCode>
+                      <c:ptCount val="6"/>
+                      <c:pt idx="0">
+                        <c:v>1</c:v>
+                      </c:pt>
+                      <c:pt idx="1">
+                        <c:v>2</c:v>
+                      </c:pt>
+                      <c:pt idx="2">
+                        <c:v>3</c:v>
+                      </c:pt>
+                      <c:pt idx="3">
+                        <c:v>4</c:v>
+                      </c:pt>
+                      <c:pt idx="4">
+                        <c:v>5</c:v>
+                      </c:pt>
+                      <c:pt idx="5">
+                        <c:v>6</c:v>
+                      </c:pt>
+                    </c:numCache>
+                  </c:numRef>
+                </c:val>
+                <c:extLst>
+                  <c:ext xmlns:c16="http://schemas.microsoft.com/office/drawing/2014/chart" uri="{C3380CC4-5D6E-409C-BE32-E72D297353CC}">
+                    <c16:uniqueId val="{00000003-73FE-453F-9405-7BD303270744}"/>
+                  </c:ext>
+                </c:extLst>
+              </c15:ser>
+            </c15:filteredBarSeries>
+          </c:ext>
+        </c:extLst>
+      </c:barChart>
+      <c:catAx>
+        <c:axId val="349506480"/>
+        <c:scaling>
+          <c:orientation val="minMax"/>
+        </c:scaling>
+        <c:delete val="0"/>
+        <c:axPos val="b"/>
+        <c:majorTickMark val="none"/>
+        <c:minorTickMark val="none"/>
+        <c:tickLblPos val="nextTo"/>
+        <c:spPr>
+          <a:noFill/>
+          <a:ln w="9525" cap="flat" cmpd="sng" algn="ctr">
+            <a:solidFill>
+              <a:schemeClr val="tx1">
+                <a:lumMod val="15000"/>
+                <a:lumOff val="85000"/>
+              </a:schemeClr>
+            </a:solidFill>
+            <a:round/>
+          </a:ln>
+          <a:effectLst/>
+        </c:spPr>
+        <c:txPr>
+          <a:bodyPr rot="-60000000" spcFirstLastPara="1" vertOverflow="ellipsis" vert="horz" wrap="square" anchor="ctr" anchorCtr="1"/>
+          <a:lstStyle/>
+          <a:p>
+            <a:pPr>
+              <a:defRPr sz="900" b="0" i="0" u="none" strike="noStrike" kern="1200" baseline="0">
+                <a:solidFill>
+                  <a:schemeClr val="tx1">
+                    <a:lumMod val="65000"/>
+                    <a:lumOff val="35000"/>
+                  </a:schemeClr>
+                </a:solidFill>
+                <a:latin typeface="+mn-lt"/>
+                <a:ea typeface="+mn-ea"/>
+                <a:cs typeface="+mn-cs"/>
+              </a:defRPr>
+            </a:pPr>
+            <a:endParaRPr lang="es-ES"/>
+          </a:p>
+        </c:txPr>
+        <c:crossAx val="349507792"/>
+        <c:crosses val="autoZero"/>
+        <c:auto val="1"/>
+        <c:lblAlgn val="ctr"/>
+        <c:lblOffset val="100"/>
+        <c:noMultiLvlLbl val="0"/>
+      </c:catAx>
+      <c:valAx>
+        <c:axId val="349507792"/>
+        <c:scaling>
+          <c:orientation val="minMax"/>
+        </c:scaling>
+        <c:delete val="0"/>
+        <c:axPos val="l"/>
+        <c:majorGridlines>
+          <c:spPr>
+            <a:ln w="9525" cap="flat" cmpd="sng" algn="ctr">
+              <a:solidFill>
+                <a:schemeClr val="tx1">
+                  <a:lumMod val="15000"/>
+                  <a:lumOff val="85000"/>
+                </a:schemeClr>
+              </a:solidFill>
+              <a:round/>
+            </a:ln>
+            <a:effectLst/>
+          </c:spPr>
+        </c:majorGridlines>
+        <c:numFmt formatCode="General" sourceLinked="1"/>
+        <c:majorTickMark val="none"/>
+        <c:minorTickMark val="none"/>
+        <c:tickLblPos val="nextTo"/>
+        <c:spPr>
+          <a:noFill/>
+          <a:ln>
+            <a:noFill/>
+          </a:ln>
+          <a:effectLst/>
+        </c:spPr>
+        <c:txPr>
+          <a:bodyPr rot="-60000000" spcFirstLastPara="1" vertOverflow="ellipsis" vert="horz" wrap="square" anchor="ctr" anchorCtr="1"/>
+          <a:lstStyle/>
+          <a:p>
+            <a:pPr>
+              <a:defRPr sz="900" b="0" i="0" u="none" strike="noStrike" kern="1200" baseline="0">
+                <a:solidFill>
+                  <a:schemeClr val="tx1">
+                    <a:lumMod val="65000"/>
+                    <a:lumOff val="35000"/>
+                  </a:schemeClr>
+                </a:solidFill>
+                <a:latin typeface="+mn-lt"/>
+                <a:ea typeface="+mn-ea"/>
+                <a:cs typeface="+mn-cs"/>
+              </a:defRPr>
+            </a:pPr>
+            <a:endParaRPr lang="es-ES"/>
+          </a:p>
+        </c:txPr>
+        <c:crossAx val="349506480"/>
+        <c:crosses val="autoZero"/>
+        <c:crossBetween val="between"/>
+      </c:valAx>
+      <c:spPr>
+        <a:noFill/>
+        <a:ln>
+          <a:noFill/>
+        </a:ln>
+        <a:effectLst/>
+      </c:spPr>
+    </c:plotArea>
+    <c:plotVisOnly val="1"/>
+    <c:dispBlanksAs val="gap"/>
+    <c:showDLblsOverMax val="0"/>
+  </c:chart>
+  <c:spPr>
+    <a:noFill/>
+    <a:ln>
+      <a:solidFill>
+        <a:schemeClr val="tx1"/>
+      </a:solidFill>
+    </a:ln>
+    <a:effectLst/>
+  </c:spPr>
+  <c:txPr>
+    <a:bodyPr/>
+    <a:lstStyle/>
+    <a:p>
+      <a:pPr>
+        <a:defRPr/>
+      </a:pPr>
+      <a:endParaRPr lang="es-ES"/>
+    </a:p>
+  </c:txPr>
+  <c:externalData r:id="rId3">
+    <c:autoUpdate val="0"/>
+  </c:externalData>
+</c:chartSpace>
+</file>
+
+<file path=ppt/charts/chart2.xml><?xml version="1.0" encoding="utf-8"?>
 <c:chartSpace xmlns:c="http://schemas.openxmlformats.org/drawingml/2006/chart" xmlns:a="http://schemas.openxmlformats.org/drawingml/2006/main" xmlns:r="http://schemas.openxmlformats.org/officeDocument/2006/relationships" xmlns:c16r2="http://schemas.microsoft.com/office/drawing/2015/06/chart">
   <c:date1904 val="0"/>
   <c:lang val="en-US"/>
@@ -458,7 +1029,7 @@
 </c:chartSpace>
 </file>
 
-<file path=ppt/charts/chart2.xml><?xml version="1.0" encoding="utf-8"?>
+<file path=ppt/charts/chart3.xml><?xml version="1.0" encoding="utf-8"?>
 <c:chartSpace xmlns:c="http://schemas.openxmlformats.org/drawingml/2006/chart" xmlns:a="http://schemas.openxmlformats.org/drawingml/2006/main" xmlns:r="http://schemas.openxmlformats.org/officeDocument/2006/relationships" xmlns:c16r2="http://schemas.microsoft.com/office/drawing/2015/06/chart">
   <c:date1904 val="0"/>
   <c:lang val="en-US"/>
@@ -967,7 +1538,7 @@
 </c:chartSpace>
 </file>
 
-<file path=ppt/charts/chart3.xml><?xml version="1.0" encoding="utf-8"?>
+<file path=ppt/charts/chart4.xml><?xml version="1.0" encoding="utf-8"?>
 <c:chartSpace xmlns:c="http://schemas.openxmlformats.org/drawingml/2006/chart" xmlns:a="http://schemas.openxmlformats.org/drawingml/2006/main" xmlns:r="http://schemas.openxmlformats.org/officeDocument/2006/relationships" xmlns:c16r2="http://schemas.microsoft.com/office/drawing/2015/06/chart">
   <c:date1904 val="0"/>
   <c:lang val="en-US"/>
@@ -1595,7 +2166,7 @@
 </c:chartSpace>
 </file>
 
-<file path=ppt/charts/chart4.xml><?xml version="1.0" encoding="utf-8"?>
+<file path=ppt/charts/chart5.xml><?xml version="1.0" encoding="utf-8"?>
 <c:chartSpace xmlns:c="http://schemas.openxmlformats.org/drawingml/2006/chart" xmlns:a="http://schemas.openxmlformats.org/drawingml/2006/main" xmlns:r="http://schemas.openxmlformats.org/officeDocument/2006/relationships" xmlns:c16r2="http://schemas.microsoft.com/office/drawing/2015/06/chart">
   <c:date1904 val="0"/>
   <c:lang val="en-US"/>
@@ -2209,7 +2780,7 @@
 </c:chartSpace>
 </file>
 
-<file path=ppt/charts/chart5.xml><?xml version="1.0" encoding="utf-8"?>
+<file path=ppt/charts/chart6.xml><?xml version="1.0" encoding="utf-8"?>
 <c:chartSpace xmlns:c="http://schemas.openxmlformats.org/drawingml/2006/chart" xmlns:a="http://schemas.openxmlformats.org/drawingml/2006/main" xmlns:r="http://schemas.openxmlformats.org/officeDocument/2006/relationships" xmlns:c16r2="http://schemas.microsoft.com/office/drawing/2015/06/chart">
   <c:date1904 val="0"/>
   <c:lang val="en-US"/>
@@ -2931,7 +3502,7 @@
 </c:chartSpace>
 </file>
 
-<file path=ppt/charts/chart6.xml><?xml version="1.0" encoding="utf-8"?>
+<file path=ppt/charts/chart7.xml><?xml version="1.0" encoding="utf-8"?>
 <c:chartSpace xmlns:c="http://schemas.openxmlformats.org/drawingml/2006/chart" xmlns:a="http://schemas.openxmlformats.org/drawingml/2006/main" xmlns:r="http://schemas.openxmlformats.org/officeDocument/2006/relationships" xmlns:c16r2="http://schemas.microsoft.com/office/drawing/2015/06/chart">
   <c:date1904 val="0"/>
   <c:lang val="en-US"/>
@@ -4058,8 +4629,48 @@
 </cs:colorStyle>
 </file>
 
+<file path=ppt/charts/colors7.xml><?xml version="1.0" encoding="utf-8"?>
+<cs:colorStyle xmlns:cs="http://schemas.microsoft.com/office/drawing/2012/chartStyle" xmlns:a="http://schemas.openxmlformats.org/drawingml/2006/main" meth="cycle" id="10">
+  <a:schemeClr val="accent1"/>
+  <a:schemeClr val="accent2"/>
+  <a:schemeClr val="accent3"/>
+  <a:schemeClr val="accent4"/>
+  <a:schemeClr val="accent5"/>
+  <a:schemeClr val="accent6"/>
+  <cs:variation/>
+  <cs:variation>
+    <a:lumMod val="60000"/>
+  </cs:variation>
+  <cs:variation>
+    <a:lumMod val="80000"/>
+    <a:lumOff val="20000"/>
+  </cs:variation>
+  <cs:variation>
+    <a:lumMod val="80000"/>
+  </cs:variation>
+  <cs:variation>
+    <a:lumMod val="60000"/>
+    <a:lumOff val="40000"/>
+  </cs:variation>
+  <cs:variation>
+    <a:lumMod val="50000"/>
+  </cs:variation>
+  <cs:variation>
+    <a:lumMod val="70000"/>
+    <a:lumOff val="30000"/>
+  </cs:variation>
+  <cs:variation>
+    <a:lumMod val="70000"/>
+  </cs:variation>
+  <cs:variation>
+    <a:lumMod val="50000"/>
+    <a:lumOff val="50000"/>
+  </cs:variation>
+</cs:colorStyle>
+</file>
+
 <file path=ppt/charts/style1.xml><?xml version="1.0" encoding="utf-8"?>
-<cs:chartStyle xmlns:cs="http://schemas.microsoft.com/office/drawing/2012/chartStyle" xmlns:a="http://schemas.openxmlformats.org/drawingml/2006/main" id="227">
+<cs:chartStyle xmlns:cs="http://schemas.microsoft.com/office/drawing/2012/chartStyle" xmlns:a="http://schemas.openxmlformats.org/drawingml/2006/main" id="201">
   <cs:axisTitle>
     <cs:lnRef idx="0"/>
     <cs:fillRef idx="0"/>
@@ -4167,11 +4778,6 @@
     <cs:fontRef idx="minor">
       <a:schemeClr val="tx1"/>
     </cs:fontRef>
-    <cs:spPr>
-      <a:solidFill>
-        <a:schemeClr val="phClr"/>
-      </a:solidFill>
-    </cs:spPr>
   </cs:dataPoint>
   <cs:dataPoint3D>
     <cs:lnRef idx="0"/>
@@ -4182,11 +4788,6 @@
     <cs:fontRef idx="minor">
       <a:schemeClr val="tx1"/>
     </cs:fontRef>
-    <cs:spPr>
-      <a:solidFill>
-        <a:schemeClr val="phClr"/>
-      </a:solidFill>
-    </cs:spPr>
   </cs:dataPoint3D>
   <cs:dataPointLine>
     <cs:lnRef idx="0">
@@ -4218,9 +4819,6 @@
       <a:schemeClr val="tx1"/>
     </cs:fontRef>
     <cs:spPr>
-      <a:solidFill>
-        <a:schemeClr val="phClr"/>
-      </a:solidFill>
       <a:ln w="9525">
         <a:solidFill>
           <a:schemeClr val="phClr"/>
@@ -4575,7 +5173,7 @@
 </file>
 
 <file path=ppt/charts/style2.xml><?xml version="1.0" encoding="utf-8"?>
-<cs:chartStyle xmlns:cs="http://schemas.microsoft.com/office/drawing/2012/chartStyle" xmlns:a="http://schemas.openxmlformats.org/drawingml/2006/main" id="201">
+<cs:chartStyle xmlns:cs="http://schemas.microsoft.com/office/drawing/2012/chartStyle" xmlns:a="http://schemas.openxmlformats.org/drawingml/2006/main" id="227">
   <cs:axisTitle>
     <cs:lnRef idx="0"/>
     <cs:fillRef idx="0"/>
@@ -4683,6 +5281,11 @@
     <cs:fontRef idx="minor">
       <a:schemeClr val="tx1"/>
     </cs:fontRef>
+    <cs:spPr>
+      <a:solidFill>
+        <a:schemeClr val="phClr"/>
+      </a:solidFill>
+    </cs:spPr>
   </cs:dataPoint>
   <cs:dataPoint3D>
     <cs:lnRef idx="0"/>
@@ -4693,6 +5296,11 @@
     <cs:fontRef idx="minor">
       <a:schemeClr val="tx1"/>
     </cs:fontRef>
+    <cs:spPr>
+      <a:solidFill>
+        <a:schemeClr val="phClr"/>
+      </a:solidFill>
+    </cs:spPr>
   </cs:dataPoint3D>
   <cs:dataPointLine>
     <cs:lnRef idx="0">
@@ -4724,6 +5332,9 @@
       <a:schemeClr val="tx1"/>
     </cs:fontRef>
     <cs:spPr>
+      <a:solidFill>
+        <a:schemeClr val="phClr"/>
+      </a:solidFill>
       <a:ln w="9525">
         <a:solidFill>
           <a:schemeClr val="phClr"/>
@@ -5581,7 +6192,7 @@
 </file>
 
 <file path=ppt/charts/style4.xml><?xml version="1.0" encoding="utf-8"?>
-<cs:chartStyle xmlns:cs="http://schemas.microsoft.com/office/drawing/2012/chartStyle" xmlns:a="http://schemas.openxmlformats.org/drawingml/2006/main" id="286">
+<cs:chartStyle xmlns:cs="http://schemas.microsoft.com/office/drawing/2012/chartStyle" xmlns:a="http://schemas.openxmlformats.org/drawingml/2006/main" id="201">
   <cs:axisTitle>
     <cs:lnRef idx="0"/>
     <cs:fillRef idx="0"/>
@@ -5604,6 +6215,17 @@
         <a:lumOff val="35000"/>
       </a:schemeClr>
     </cs:fontRef>
+    <cs:spPr>
+      <a:ln w="9525" cap="flat" cmpd="sng" algn="ctr">
+        <a:solidFill>
+          <a:schemeClr val="tx1">
+            <a:lumMod val="15000"/>
+            <a:lumOff val="85000"/>
+          </a:schemeClr>
+        </a:solidFill>
+        <a:round/>
+      </a:ln>
+    </cs:spPr>
     <cs:defRPr sz="900" kern="1200"/>
   </cs:categoryAxis>
   <cs:chartArea mods="allowNoFillOverride allowNoLineOverride">
@@ -5774,6 +6396,498 @@
     <cs:fillRef idx="0"/>
     <cs:effectRef idx="0"/>
     <cs:fontRef idx="minor">
+      <a:schemeClr val="dk1"/>
+    </cs:fontRef>
+    <cs:spPr>
+      <a:solidFill>
+        <a:schemeClr val="dk1">
+          <a:lumMod val="65000"/>
+          <a:lumOff val="35000"/>
+        </a:schemeClr>
+      </a:solidFill>
+      <a:ln w="9525">
+        <a:solidFill>
+          <a:schemeClr val="tx1">
+            <a:lumMod val="65000"/>
+            <a:lumOff val="35000"/>
+          </a:schemeClr>
+        </a:solidFill>
+      </a:ln>
+    </cs:spPr>
+  </cs:downBar>
+  <cs:dropLine>
+    <cs:lnRef idx="0"/>
+    <cs:fillRef idx="0"/>
+    <cs:effectRef idx="0"/>
+    <cs:fontRef idx="minor">
+      <a:schemeClr val="tx1"/>
+    </cs:fontRef>
+    <cs:spPr>
+      <a:ln w="9525" cap="flat" cmpd="sng" algn="ctr">
+        <a:solidFill>
+          <a:schemeClr val="tx1">
+            <a:lumMod val="35000"/>
+            <a:lumOff val="65000"/>
+          </a:schemeClr>
+        </a:solidFill>
+        <a:round/>
+      </a:ln>
+    </cs:spPr>
+  </cs:dropLine>
+  <cs:errorBar>
+    <cs:lnRef idx="0"/>
+    <cs:fillRef idx="0"/>
+    <cs:effectRef idx="0"/>
+    <cs:fontRef idx="minor">
+      <a:schemeClr val="tx1"/>
+    </cs:fontRef>
+    <cs:spPr>
+      <a:ln w="9525" cap="flat" cmpd="sng" algn="ctr">
+        <a:solidFill>
+          <a:schemeClr val="tx1">
+            <a:lumMod val="65000"/>
+            <a:lumOff val="35000"/>
+          </a:schemeClr>
+        </a:solidFill>
+        <a:round/>
+      </a:ln>
+    </cs:spPr>
+  </cs:errorBar>
+  <cs:floor>
+    <cs:lnRef idx="0"/>
+    <cs:fillRef idx="0"/>
+    <cs:effectRef idx="0"/>
+    <cs:fontRef idx="minor">
+      <a:schemeClr val="tx1"/>
+    </cs:fontRef>
+    <cs:spPr>
+      <a:noFill/>
+      <a:ln>
+        <a:noFill/>
+      </a:ln>
+    </cs:spPr>
+  </cs:floor>
+  <cs:gridlineMajor>
+    <cs:lnRef idx="0"/>
+    <cs:fillRef idx="0"/>
+    <cs:effectRef idx="0"/>
+    <cs:fontRef idx="minor">
+      <a:schemeClr val="tx1"/>
+    </cs:fontRef>
+    <cs:spPr>
+      <a:ln w="9525" cap="flat" cmpd="sng" algn="ctr">
+        <a:solidFill>
+          <a:schemeClr val="tx1">
+            <a:lumMod val="15000"/>
+            <a:lumOff val="85000"/>
+          </a:schemeClr>
+        </a:solidFill>
+        <a:round/>
+      </a:ln>
+    </cs:spPr>
+  </cs:gridlineMajor>
+  <cs:gridlineMinor>
+    <cs:lnRef idx="0"/>
+    <cs:fillRef idx="0"/>
+    <cs:effectRef idx="0"/>
+    <cs:fontRef idx="minor">
+      <a:schemeClr val="tx1"/>
+    </cs:fontRef>
+    <cs:spPr>
+      <a:ln w="9525" cap="flat" cmpd="sng" algn="ctr">
+        <a:solidFill>
+          <a:schemeClr val="tx1">
+            <a:lumMod val="5000"/>
+            <a:lumOff val="95000"/>
+          </a:schemeClr>
+        </a:solidFill>
+        <a:round/>
+      </a:ln>
+    </cs:spPr>
+  </cs:gridlineMinor>
+  <cs:hiLoLine>
+    <cs:lnRef idx="0"/>
+    <cs:fillRef idx="0"/>
+    <cs:effectRef idx="0"/>
+    <cs:fontRef idx="minor">
+      <a:schemeClr val="tx1"/>
+    </cs:fontRef>
+    <cs:spPr>
+      <a:ln w="9525" cap="flat" cmpd="sng" algn="ctr">
+        <a:solidFill>
+          <a:schemeClr val="tx1">
+            <a:lumMod val="75000"/>
+            <a:lumOff val="25000"/>
+          </a:schemeClr>
+        </a:solidFill>
+        <a:round/>
+      </a:ln>
+    </cs:spPr>
+  </cs:hiLoLine>
+  <cs:leaderLine>
+    <cs:lnRef idx="0"/>
+    <cs:fillRef idx="0"/>
+    <cs:effectRef idx="0"/>
+    <cs:fontRef idx="minor">
+      <a:schemeClr val="tx1"/>
+    </cs:fontRef>
+    <cs:spPr>
+      <a:ln w="9525" cap="flat" cmpd="sng" algn="ctr">
+        <a:solidFill>
+          <a:schemeClr val="tx1">
+            <a:lumMod val="35000"/>
+            <a:lumOff val="65000"/>
+          </a:schemeClr>
+        </a:solidFill>
+        <a:round/>
+      </a:ln>
+    </cs:spPr>
+  </cs:leaderLine>
+  <cs:legend>
+    <cs:lnRef idx="0"/>
+    <cs:fillRef idx="0"/>
+    <cs:effectRef idx="0"/>
+    <cs:fontRef idx="minor">
+      <a:schemeClr val="tx1">
+        <a:lumMod val="65000"/>
+        <a:lumOff val="35000"/>
+      </a:schemeClr>
+    </cs:fontRef>
+    <cs:defRPr sz="900" kern="1200"/>
+  </cs:legend>
+  <cs:plotArea mods="allowNoFillOverride allowNoLineOverride">
+    <cs:lnRef idx="0"/>
+    <cs:fillRef idx="0"/>
+    <cs:effectRef idx="0"/>
+    <cs:fontRef idx="minor">
+      <a:schemeClr val="tx1"/>
+    </cs:fontRef>
+  </cs:plotArea>
+  <cs:plotArea3D mods="allowNoFillOverride allowNoLineOverride">
+    <cs:lnRef idx="0"/>
+    <cs:fillRef idx="0"/>
+    <cs:effectRef idx="0"/>
+    <cs:fontRef idx="minor">
+      <a:schemeClr val="tx1"/>
+    </cs:fontRef>
+  </cs:plotArea3D>
+  <cs:seriesAxis>
+    <cs:lnRef idx="0"/>
+    <cs:fillRef idx="0"/>
+    <cs:effectRef idx="0"/>
+    <cs:fontRef idx="minor">
+      <a:schemeClr val="tx1">
+        <a:lumMod val="65000"/>
+        <a:lumOff val="35000"/>
+      </a:schemeClr>
+    </cs:fontRef>
+    <cs:defRPr sz="900" kern="1200"/>
+  </cs:seriesAxis>
+  <cs:seriesLine>
+    <cs:lnRef idx="0"/>
+    <cs:fillRef idx="0"/>
+    <cs:effectRef idx="0"/>
+    <cs:fontRef idx="minor">
+      <a:schemeClr val="tx1"/>
+    </cs:fontRef>
+    <cs:spPr>
+      <a:ln w="9525" cap="flat" cmpd="sng" algn="ctr">
+        <a:solidFill>
+          <a:schemeClr val="tx1">
+            <a:lumMod val="35000"/>
+            <a:lumOff val="65000"/>
+          </a:schemeClr>
+        </a:solidFill>
+        <a:round/>
+      </a:ln>
+    </cs:spPr>
+  </cs:seriesLine>
+  <cs:title>
+    <cs:lnRef idx="0"/>
+    <cs:fillRef idx="0"/>
+    <cs:effectRef idx="0"/>
+    <cs:fontRef idx="minor">
+      <a:schemeClr val="tx1">
+        <a:lumMod val="65000"/>
+        <a:lumOff val="35000"/>
+      </a:schemeClr>
+    </cs:fontRef>
+    <cs:defRPr sz="1400" b="0" kern="1200" spc="0" baseline="0"/>
+  </cs:title>
+  <cs:trendline>
+    <cs:lnRef idx="0">
+      <cs:styleClr val="auto"/>
+    </cs:lnRef>
+    <cs:fillRef idx="0"/>
+    <cs:effectRef idx="0"/>
+    <cs:fontRef idx="minor">
+      <a:schemeClr val="tx1"/>
+    </cs:fontRef>
+    <cs:spPr>
+      <a:ln w="19050" cap="rnd">
+        <a:solidFill>
+          <a:schemeClr val="phClr"/>
+        </a:solidFill>
+        <a:prstDash val="sysDot"/>
+      </a:ln>
+    </cs:spPr>
+  </cs:trendline>
+  <cs:trendlineLabel>
+    <cs:lnRef idx="0"/>
+    <cs:fillRef idx="0"/>
+    <cs:effectRef idx="0"/>
+    <cs:fontRef idx="minor">
+      <a:schemeClr val="tx1">
+        <a:lumMod val="65000"/>
+        <a:lumOff val="35000"/>
+      </a:schemeClr>
+    </cs:fontRef>
+    <cs:defRPr sz="900" kern="1200"/>
+  </cs:trendlineLabel>
+  <cs:upBar>
+    <cs:lnRef idx="0"/>
+    <cs:fillRef idx="0"/>
+    <cs:effectRef idx="0"/>
+    <cs:fontRef idx="minor">
+      <a:schemeClr val="dk1"/>
+    </cs:fontRef>
+    <cs:spPr>
+      <a:solidFill>
+        <a:schemeClr val="lt1"/>
+      </a:solidFill>
+      <a:ln w="9525">
+        <a:solidFill>
+          <a:schemeClr val="tx1">
+            <a:lumMod val="15000"/>
+            <a:lumOff val="85000"/>
+          </a:schemeClr>
+        </a:solidFill>
+      </a:ln>
+    </cs:spPr>
+  </cs:upBar>
+  <cs:valueAxis>
+    <cs:lnRef idx="0"/>
+    <cs:fillRef idx="0"/>
+    <cs:effectRef idx="0"/>
+    <cs:fontRef idx="minor">
+      <a:schemeClr val="tx1">
+        <a:lumMod val="65000"/>
+        <a:lumOff val="35000"/>
+      </a:schemeClr>
+    </cs:fontRef>
+    <cs:defRPr sz="900" kern="1200"/>
+  </cs:valueAxis>
+  <cs:wall>
+    <cs:lnRef idx="0"/>
+    <cs:fillRef idx="0"/>
+    <cs:effectRef idx="0"/>
+    <cs:fontRef idx="minor">
+      <a:schemeClr val="tx1"/>
+    </cs:fontRef>
+    <cs:spPr>
+      <a:noFill/>
+      <a:ln>
+        <a:noFill/>
+      </a:ln>
+    </cs:spPr>
+  </cs:wall>
+</cs:chartStyle>
+</file>
+
+<file path=ppt/charts/style5.xml><?xml version="1.0" encoding="utf-8"?>
+<cs:chartStyle xmlns:cs="http://schemas.microsoft.com/office/drawing/2012/chartStyle" xmlns:a="http://schemas.openxmlformats.org/drawingml/2006/main" id="286">
+  <cs:axisTitle>
+    <cs:lnRef idx="0"/>
+    <cs:fillRef idx="0"/>
+    <cs:effectRef idx="0"/>
+    <cs:fontRef idx="minor">
+      <a:schemeClr val="tx1">
+        <a:lumMod val="65000"/>
+        <a:lumOff val="35000"/>
+      </a:schemeClr>
+    </cs:fontRef>
+    <cs:defRPr sz="1000" kern="1200"/>
+  </cs:axisTitle>
+  <cs:categoryAxis>
+    <cs:lnRef idx="0"/>
+    <cs:fillRef idx="0"/>
+    <cs:effectRef idx="0"/>
+    <cs:fontRef idx="minor">
+      <a:schemeClr val="tx1">
+        <a:lumMod val="65000"/>
+        <a:lumOff val="35000"/>
+      </a:schemeClr>
+    </cs:fontRef>
+    <cs:defRPr sz="900" kern="1200"/>
+  </cs:categoryAxis>
+  <cs:chartArea mods="allowNoFillOverride allowNoLineOverride">
+    <cs:lnRef idx="0"/>
+    <cs:fillRef idx="0"/>
+    <cs:effectRef idx="0"/>
+    <cs:fontRef idx="minor">
+      <a:schemeClr val="tx1"/>
+    </cs:fontRef>
+    <cs:spPr>
+      <a:solidFill>
+        <a:schemeClr val="bg1"/>
+      </a:solidFill>
+      <a:ln w="9525" cap="flat" cmpd="sng" algn="ctr">
+        <a:solidFill>
+          <a:schemeClr val="tx1">
+            <a:lumMod val="15000"/>
+            <a:lumOff val="85000"/>
+          </a:schemeClr>
+        </a:solidFill>
+        <a:round/>
+      </a:ln>
+    </cs:spPr>
+    <cs:defRPr sz="1000" kern="1200"/>
+  </cs:chartArea>
+  <cs:dataLabel>
+    <cs:lnRef idx="0"/>
+    <cs:fillRef idx="0"/>
+    <cs:effectRef idx="0"/>
+    <cs:fontRef idx="minor">
+      <a:schemeClr val="tx1">
+        <a:lumMod val="75000"/>
+        <a:lumOff val="25000"/>
+      </a:schemeClr>
+    </cs:fontRef>
+    <cs:defRPr sz="900" kern="1200"/>
+  </cs:dataLabel>
+  <cs:dataLabelCallout>
+    <cs:lnRef idx="0"/>
+    <cs:fillRef idx="0"/>
+    <cs:effectRef idx="0"/>
+    <cs:fontRef idx="minor">
+      <a:schemeClr val="dk1">
+        <a:lumMod val="65000"/>
+        <a:lumOff val="35000"/>
+      </a:schemeClr>
+    </cs:fontRef>
+    <cs:spPr>
+      <a:solidFill>
+        <a:schemeClr val="lt1"/>
+      </a:solidFill>
+      <a:ln>
+        <a:solidFill>
+          <a:schemeClr val="dk1">
+            <a:lumMod val="25000"/>
+            <a:lumOff val="75000"/>
+          </a:schemeClr>
+        </a:solidFill>
+      </a:ln>
+    </cs:spPr>
+    <cs:defRPr sz="900" kern="1200"/>
+    <cs:bodyPr rot="0" spcFirstLastPara="1" vertOverflow="clip" horzOverflow="clip" vert="horz" wrap="square" lIns="36576" tIns="18288" rIns="36576" bIns="18288" anchor="ctr" anchorCtr="1">
+      <a:spAutoFit/>
+    </cs:bodyPr>
+  </cs:dataLabelCallout>
+  <cs:dataPoint>
+    <cs:lnRef idx="0"/>
+    <cs:fillRef idx="1">
+      <cs:styleClr val="auto"/>
+    </cs:fillRef>
+    <cs:effectRef idx="0"/>
+    <cs:fontRef idx="minor">
+      <a:schemeClr val="tx1"/>
+    </cs:fontRef>
+  </cs:dataPoint>
+  <cs:dataPoint3D>
+    <cs:lnRef idx="0"/>
+    <cs:fillRef idx="1">
+      <cs:styleClr val="auto"/>
+    </cs:fillRef>
+    <cs:effectRef idx="0"/>
+    <cs:fontRef idx="minor">
+      <a:schemeClr val="tx1"/>
+    </cs:fontRef>
+  </cs:dataPoint3D>
+  <cs:dataPointLine>
+    <cs:lnRef idx="0">
+      <cs:styleClr val="auto"/>
+    </cs:lnRef>
+    <cs:fillRef idx="1"/>
+    <cs:effectRef idx="0"/>
+    <cs:fontRef idx="minor">
+      <a:schemeClr val="tx1"/>
+    </cs:fontRef>
+    <cs:spPr>
+      <a:ln w="28575" cap="rnd">
+        <a:solidFill>
+          <a:schemeClr val="phClr"/>
+        </a:solidFill>
+        <a:round/>
+      </a:ln>
+    </cs:spPr>
+  </cs:dataPointLine>
+  <cs:dataPointMarker>
+    <cs:lnRef idx="0">
+      <cs:styleClr val="auto"/>
+    </cs:lnRef>
+    <cs:fillRef idx="1">
+      <cs:styleClr val="auto"/>
+    </cs:fillRef>
+    <cs:effectRef idx="0"/>
+    <cs:fontRef idx="minor">
+      <a:schemeClr val="tx1"/>
+    </cs:fontRef>
+    <cs:spPr>
+      <a:ln w="9525">
+        <a:solidFill>
+          <a:schemeClr val="phClr"/>
+        </a:solidFill>
+      </a:ln>
+    </cs:spPr>
+  </cs:dataPointMarker>
+  <cs:dataPointMarkerLayout symbol="circle" size="5"/>
+  <cs:dataPointWireframe>
+    <cs:lnRef idx="0">
+      <cs:styleClr val="auto"/>
+    </cs:lnRef>
+    <cs:fillRef idx="1"/>
+    <cs:effectRef idx="0"/>
+    <cs:fontRef idx="minor">
+      <a:schemeClr val="tx1"/>
+    </cs:fontRef>
+    <cs:spPr>
+      <a:ln w="9525" cap="rnd">
+        <a:solidFill>
+          <a:schemeClr val="phClr"/>
+        </a:solidFill>
+        <a:round/>
+      </a:ln>
+    </cs:spPr>
+  </cs:dataPointWireframe>
+  <cs:dataTable>
+    <cs:lnRef idx="0"/>
+    <cs:fillRef idx="0"/>
+    <cs:effectRef idx="0"/>
+    <cs:fontRef idx="minor">
+      <a:schemeClr val="tx1">
+        <a:lumMod val="65000"/>
+        <a:lumOff val="35000"/>
+      </a:schemeClr>
+    </cs:fontRef>
+    <cs:spPr>
+      <a:noFill/>
+      <a:ln w="9525" cap="flat" cmpd="sng" algn="ctr">
+        <a:solidFill>
+          <a:schemeClr val="tx1">
+            <a:lumMod val="15000"/>
+            <a:lumOff val="85000"/>
+          </a:schemeClr>
+        </a:solidFill>
+        <a:round/>
+      </a:ln>
+    </cs:spPr>
+    <cs:defRPr sz="900" kern="1200"/>
+  </cs:dataTable>
+  <cs:downBar>
+    <cs:lnRef idx="0"/>
+    <cs:fillRef idx="0"/>
+    <cs:effectRef idx="0"/>
+    <cs:fontRef idx="minor">
       <a:schemeClr val="tx1"/>
     </cs:fontRef>
     <cs:spPr>
@@ -6074,7 +7188,7 @@
 </cs:chartStyle>
 </file>
 
-<file path=ppt/charts/style5.xml><?xml version="1.0" encoding="utf-8"?>
+<file path=ppt/charts/style6.xml><?xml version="1.0" encoding="utf-8"?>
 <cs:chartStyle xmlns:cs="http://schemas.microsoft.com/office/drawing/2012/chartStyle" xmlns:a="http://schemas.openxmlformats.org/drawingml/2006/main" id="286">
   <cs:axisTitle>
     <cs:lnRef idx="0"/>
@@ -6568,7 +7682,7 @@
 </cs:chartStyle>
 </file>
 
-<file path=ppt/charts/style6.xml><?xml version="1.0" encoding="utf-8"?>
+<file path=ppt/charts/style7.xml><?xml version="1.0" encoding="utf-8"?>
 <cs:chartStyle xmlns:cs="http://schemas.microsoft.com/office/drawing/2012/chartStyle" xmlns:a="http://schemas.openxmlformats.org/drawingml/2006/main" id="286">
   <cs:axisTitle>
     <cs:lnRef idx="0"/>
@@ -7144,7 +8258,7 @@
           <a:p>
             <a:fld id="{0A91C72F-2151-425B-AF9B-9E6482B4EE63}" type="datetimeFigureOut">
               <a:rPr lang="es-ES" smtClean="0"/>
-              <a:t>01/02/2017</a:t>
+              <a:t>02/02/2017</a:t>
             </a:fld>
             <a:endParaRPr lang="es-ES"/>
           </a:p>
@@ -7545,7 +8659,7 @@
             <a:fld id="{2E3D600E-47DC-496F-BE1F-CBA9CFDB76F9}" type="datetimeFigureOut">
               <a:rPr lang="es-ES" smtClean="0"/>
               <a:pPr/>
-              <a:t>01/02/2017</a:t>
+              <a:t>02/02/2017</a:t>
             </a:fld>
             <a:endParaRPr lang="es-ES"/>
           </a:p>
@@ -7846,7 +8960,7 @@
             <a:fld id="{2E3D600E-47DC-496F-BE1F-CBA9CFDB76F9}" type="datetimeFigureOut">
               <a:rPr lang="es-ES" smtClean="0"/>
               <a:pPr/>
-              <a:t>01/02/2017</a:t>
+              <a:t>02/02/2017</a:t>
             </a:fld>
             <a:endParaRPr lang="es-ES"/>
           </a:p>
@@ -8023,7 +9137,7 @@
             <a:fld id="{2E3D600E-47DC-496F-BE1F-CBA9CFDB76F9}" type="datetimeFigureOut">
               <a:rPr lang="es-ES" smtClean="0"/>
               <a:pPr/>
-              <a:t>01/02/2017</a:t>
+              <a:t>02/02/2017</a:t>
             </a:fld>
             <a:endParaRPr lang="es-ES"/>
           </a:p>
@@ -8190,7 +9304,7 @@
             <a:fld id="{2E3D600E-47DC-496F-BE1F-CBA9CFDB76F9}" type="datetimeFigureOut">
               <a:rPr lang="es-ES" smtClean="0"/>
               <a:pPr/>
-              <a:t>01/02/2017</a:t>
+              <a:t>02/02/2017</a:t>
             </a:fld>
             <a:endParaRPr lang="es-ES"/>
           </a:p>
@@ -8452,7 +9566,7 @@
             <a:fld id="{2E3D600E-47DC-496F-BE1F-CBA9CFDB76F9}" type="datetimeFigureOut">
               <a:rPr lang="es-ES" smtClean="0"/>
               <a:pPr/>
-              <a:t>01/02/2017</a:t>
+              <a:t>02/02/2017</a:t>
             </a:fld>
             <a:endParaRPr lang="es-ES"/>
           </a:p>
@@ -8908,7 +10022,7 @@
             <a:fld id="{2E3D600E-47DC-496F-BE1F-CBA9CFDB76F9}" type="datetimeFigureOut">
               <a:rPr lang="es-ES" smtClean="0"/>
               <a:pPr/>
-              <a:t>01/02/2017</a:t>
+              <a:t>02/02/2017</a:t>
             </a:fld>
             <a:endParaRPr lang="es-ES"/>
           </a:p>
@@ -9393,7 +10507,7 @@
             <a:fld id="{2E3D600E-47DC-496F-BE1F-CBA9CFDB76F9}" type="datetimeFigureOut">
               <a:rPr lang="es-ES" smtClean="0"/>
               <a:pPr/>
-              <a:t>01/02/2017</a:t>
+              <a:t>02/02/2017</a:t>
             </a:fld>
             <a:endParaRPr lang="es-ES"/>
           </a:p>
@@ -9513,7 +10627,7 @@
             <a:fld id="{2E3D600E-47DC-496F-BE1F-CBA9CFDB76F9}" type="datetimeFigureOut">
               <a:rPr lang="es-ES" smtClean="0"/>
               <a:pPr/>
-              <a:t>01/02/2017</a:t>
+              <a:t>02/02/2017</a:t>
             </a:fld>
             <a:endParaRPr lang="es-ES"/>
           </a:p>
@@ -9651,7 +10765,7 @@
             <a:fld id="{2E3D600E-47DC-496F-BE1F-CBA9CFDB76F9}" type="datetimeFigureOut">
               <a:rPr lang="es-ES" smtClean="0"/>
               <a:pPr/>
-              <a:t>01/02/2017</a:t>
+              <a:t>02/02/2017</a:t>
             </a:fld>
             <a:endParaRPr lang="es-ES"/>
           </a:p>
@@ -9967,7 +11081,7 @@
             <a:fld id="{2E3D600E-47DC-496F-BE1F-CBA9CFDB76F9}" type="datetimeFigureOut">
               <a:rPr lang="es-ES" smtClean="0"/>
               <a:pPr/>
-              <a:t>01/02/2017</a:t>
+              <a:t>02/02/2017</a:t>
             </a:fld>
             <a:endParaRPr lang="es-ES"/>
           </a:p>
@@ -10097,7 +11211,7 @@
             <a:fld id="{2E3D600E-47DC-496F-BE1F-CBA9CFDB76F9}" type="datetimeFigureOut">
               <a:rPr lang="es-ES" smtClean="0"/>
               <a:pPr/>
-              <a:t>01/02/2017</a:t>
+              <a:t>02/02/2017</a:t>
             </a:fld>
             <a:endParaRPr lang="es-ES"/>
           </a:p>
@@ -10858,7 +11972,7 @@
             <a:fld id="{2E3D600E-47DC-496F-BE1F-CBA9CFDB76F9}" type="datetimeFigureOut">
               <a:rPr lang="es-ES" smtClean="0"/>
               <a:pPr/>
-              <a:t>01/02/2017</a:t>
+              <a:t>02/02/2017</a:t>
             </a:fld>
             <a:endParaRPr lang="es-ES"/>
           </a:p>
@@ -13630,7 +14744,24 @@
             </a:pPr>
             <a:r>
               <a:rPr lang="es-ES" dirty="0"/>
-              <a:t>RESULTADOS</a:t>
+              <a:t>Política de planificación:</a:t>
+            </a:r>
+          </a:p>
+          <a:p>
+            <a:pPr marL="82296" indent="0" algn="just">
+              <a:buNone/>
+            </a:pPr>
+            <a:r>
+              <a:rPr lang="es-ES" sz="2400" dirty="0"/>
+              <a:t>Utilizando </a:t>
+            </a:r>
+            <a:r>
+              <a:rPr lang="es-ES" sz="2400" dirty="0" err="1"/>
+              <a:t>cgroups</a:t>
+            </a:r>
+            <a:r>
+              <a:rPr lang="es-ES" sz="2400" dirty="0"/>
+              <a:t> podemos planificar un conjunto de procesos, en nuestro caso la configuración para nuestro contenedor estará en:</a:t>
             </a:r>
           </a:p>
           <a:p>
@@ -13644,16 +14775,41 @@
               <a:buNone/>
             </a:pPr>
             <a:r>
-              <a:rPr lang="es-ES" dirty="0"/>
-              <a:t>Ejecutamos SPECJBB en los dos contenedores</a:t>
-            </a:r>
+              <a:rPr lang="en-US" b="1" dirty="0"/>
+              <a:t>/sys/fs/</a:t>
+            </a:r>
+            <a:r>
+              <a:rPr lang="en-US" b="1" dirty="0" err="1"/>
+              <a:t>cgroup</a:t>
+            </a:r>
+            <a:r>
+              <a:rPr lang="en-US" b="1" dirty="0"/>
+              <a:t>/</a:t>
+            </a:r>
+            <a:r>
+              <a:rPr lang="en-US" b="1" dirty="0" err="1"/>
+              <a:t>lxc</a:t>
+            </a:r>
+            <a:r>
+              <a:rPr lang="en-US" b="1" dirty="0"/>
+              <a:t>/</a:t>
+            </a:r>
+            <a:r>
+              <a:rPr lang="en-US" b="1" dirty="0" err="1"/>
+              <a:t>my_contenedor</a:t>
+            </a:r>
+            <a:r>
+              <a:rPr lang="en-US" b="1" dirty="0"/>
+              <a:t>/</a:t>
+            </a:r>
+            <a:endParaRPr lang="es-ES" dirty="0"/>
           </a:p>
         </p:txBody>
       </p:sp>
     </p:spTree>
     <p:extLst>
       <p:ext uri="{BB962C8B-B14F-4D97-AF65-F5344CB8AC3E}">
-        <p14:creationId xmlns:p14="http://schemas.microsoft.com/office/powerpoint/2010/main" val="1814843346"/>
+        <p14:creationId xmlns:p14="http://schemas.microsoft.com/office/powerpoint/2010/main" val="2569202897"/>
       </p:ext>
     </p:extLst>
   </p:cSld>
@@ -13734,97 +14890,286 @@
       </p:sp>
       <p:sp>
         <p:nvSpPr>
-          <p:cNvPr id="3" name="2 Marcador de contenido"/>
-          <p:cNvSpPr>
-            <a:spLocks noGrp="1"/>
+          <p:cNvPr id="4" name="2 Marcador de contenido"/>
+          <p:cNvSpPr txBox="1">
+            <a:spLocks/>
           </p:cNvSpPr>
-          <p:nvPr>
-            <p:ph idx="1"/>
-          </p:nvPr>
+          <p:nvPr/>
         </p:nvSpPr>
         <p:spPr>
           <a:xfrm>
-            <a:off x="1101991" y="1052736"/>
+            <a:off x="1217102" y="1052736"/>
             <a:ext cx="7926898" cy="5544616"/>
           </a:xfrm>
+          <a:prstGeom prst="rect">
+            <a:avLst/>
+          </a:prstGeom>
         </p:spPr>
         <p:txBody>
           <a:bodyPr>
             <a:normAutofit/>
           </a:bodyPr>
-          <a:lstStyle/>
+          <a:lstStyle>
+            <a:lvl1pPr marL="365760" indent="-283464" algn="l" rtl="0" eaLnBrk="1" latinLnBrk="0" hangingPunct="1">
+              <a:lnSpc>
+                <a:spcPct val="100000"/>
+              </a:lnSpc>
+              <a:spcBef>
+                <a:spcPts val="600"/>
+              </a:spcBef>
+              <a:buClr>
+                <a:schemeClr val="accent1"/>
+              </a:buClr>
+              <a:buSzPct val="80000"/>
+              <a:buFont typeface="Wingdings 2"/>
+              <a:buChar char=""/>
+              <a:defRPr kumimoji="0" sz="3200" kern="1200">
+                <a:solidFill>
+                  <a:schemeClr val="tx1"/>
+                </a:solidFill>
+                <a:latin typeface="+mn-lt"/>
+                <a:ea typeface="+mn-ea"/>
+                <a:cs typeface="+mn-cs"/>
+              </a:defRPr>
+            </a:lvl1pPr>
+            <a:lvl2pPr marL="640080" indent="-237744" algn="l" rtl="0" eaLnBrk="1" latinLnBrk="0" hangingPunct="1">
+              <a:lnSpc>
+                <a:spcPct val="100000"/>
+              </a:lnSpc>
+              <a:spcBef>
+                <a:spcPts val="550"/>
+              </a:spcBef>
+              <a:buClr>
+                <a:schemeClr val="accent1"/>
+              </a:buClr>
+              <a:buFont typeface="Verdana"/>
+              <a:buChar char="◦"/>
+              <a:defRPr kumimoji="0" sz="2800" kern="1200">
+                <a:solidFill>
+                  <a:schemeClr val="tx1"/>
+                </a:solidFill>
+                <a:latin typeface="+mn-lt"/>
+                <a:ea typeface="+mn-ea"/>
+                <a:cs typeface="+mn-cs"/>
+              </a:defRPr>
+            </a:lvl2pPr>
+            <a:lvl3pPr marL="886968" indent="-228600" algn="l" rtl="0" eaLnBrk="1" latinLnBrk="0" hangingPunct="1">
+              <a:lnSpc>
+                <a:spcPct val="100000"/>
+              </a:lnSpc>
+              <a:spcBef>
+                <a:spcPct val="20000"/>
+              </a:spcBef>
+              <a:buClr>
+                <a:schemeClr val="accent2"/>
+              </a:buClr>
+              <a:buFont typeface="Wingdings 2"/>
+              <a:buChar char=""/>
+              <a:defRPr kumimoji="0" sz="2400" kern="1200">
+                <a:solidFill>
+                  <a:schemeClr val="tx1"/>
+                </a:solidFill>
+                <a:latin typeface="+mn-lt"/>
+                <a:ea typeface="+mn-ea"/>
+                <a:cs typeface="+mn-cs"/>
+              </a:defRPr>
+            </a:lvl3pPr>
+            <a:lvl4pPr marL="1097280" indent="-173736" algn="l" rtl="0" eaLnBrk="1" latinLnBrk="0" hangingPunct="1">
+              <a:lnSpc>
+                <a:spcPct val="100000"/>
+              </a:lnSpc>
+              <a:spcBef>
+                <a:spcPct val="20000"/>
+              </a:spcBef>
+              <a:buClr>
+                <a:schemeClr val="accent3"/>
+              </a:buClr>
+              <a:buFont typeface="Wingdings 2"/>
+              <a:buChar char=""/>
+              <a:defRPr kumimoji="0" sz="2000" kern="1200">
+                <a:solidFill>
+                  <a:schemeClr val="tx1"/>
+                </a:solidFill>
+                <a:latin typeface="+mn-lt"/>
+                <a:ea typeface="+mn-ea"/>
+                <a:cs typeface="+mn-cs"/>
+              </a:defRPr>
+            </a:lvl4pPr>
+            <a:lvl5pPr marL="1298448" indent="-182880" algn="l" rtl="0" eaLnBrk="1" latinLnBrk="0" hangingPunct="1">
+              <a:lnSpc>
+                <a:spcPct val="100000"/>
+              </a:lnSpc>
+              <a:spcBef>
+                <a:spcPct val="20000"/>
+              </a:spcBef>
+              <a:buClr>
+                <a:schemeClr val="accent4"/>
+              </a:buClr>
+              <a:buFont typeface="Wingdings 2"/>
+              <a:buChar char=""/>
+              <a:defRPr kumimoji="0" sz="2000" kern="1200">
+                <a:solidFill>
+                  <a:schemeClr val="tx1"/>
+                </a:solidFill>
+                <a:latin typeface="+mn-lt"/>
+                <a:ea typeface="+mn-ea"/>
+                <a:cs typeface="+mn-cs"/>
+              </a:defRPr>
+            </a:lvl5pPr>
+            <a:lvl6pPr marL="1508760" indent="-182880" algn="l" rtl="0" eaLnBrk="1" latinLnBrk="0" hangingPunct="1">
+              <a:lnSpc>
+                <a:spcPct val="100000"/>
+              </a:lnSpc>
+              <a:spcBef>
+                <a:spcPct val="20000"/>
+              </a:spcBef>
+              <a:buClr>
+                <a:schemeClr val="accent5"/>
+              </a:buClr>
+              <a:buFont typeface="Wingdings 2"/>
+              <a:buChar char=""/>
+              <a:defRPr kumimoji="0" sz="2000" kern="1200">
+                <a:solidFill>
+                  <a:schemeClr val="tx1"/>
+                </a:solidFill>
+                <a:latin typeface="+mn-lt"/>
+                <a:ea typeface="+mn-ea"/>
+                <a:cs typeface="+mn-cs"/>
+              </a:defRPr>
+            </a:lvl6pPr>
+            <a:lvl7pPr marL="1719072" indent="-182880" algn="l" rtl="0" eaLnBrk="1" latinLnBrk="0" hangingPunct="1">
+              <a:lnSpc>
+                <a:spcPct val="100000"/>
+              </a:lnSpc>
+              <a:spcBef>
+                <a:spcPct val="20000"/>
+              </a:spcBef>
+              <a:buClr>
+                <a:schemeClr val="accent6"/>
+              </a:buClr>
+              <a:buFont typeface="Wingdings 2"/>
+              <a:buChar char=""/>
+              <a:defRPr kumimoji="0" sz="2000" kern="1200">
+                <a:solidFill>
+                  <a:schemeClr val="tx1"/>
+                </a:solidFill>
+                <a:latin typeface="+mn-lt"/>
+                <a:ea typeface="+mn-ea"/>
+                <a:cs typeface="+mn-cs"/>
+              </a:defRPr>
+            </a:lvl7pPr>
+            <a:lvl8pPr marL="1920240" indent="-182880" algn="l" rtl="0" eaLnBrk="1" latinLnBrk="0" hangingPunct="1">
+              <a:lnSpc>
+                <a:spcPct val="100000"/>
+              </a:lnSpc>
+              <a:spcBef>
+                <a:spcPct val="20000"/>
+              </a:spcBef>
+              <a:buClr>
+                <a:schemeClr val="accent6"/>
+              </a:buClr>
+              <a:buFont typeface="Wingdings 2"/>
+              <a:buChar char=""/>
+              <a:defRPr kumimoji="0" sz="2000" kern="1200">
+                <a:solidFill>
+                  <a:schemeClr val="tx1"/>
+                </a:solidFill>
+                <a:latin typeface="+mn-lt"/>
+                <a:ea typeface="+mn-ea"/>
+                <a:cs typeface="+mn-cs"/>
+              </a:defRPr>
+            </a:lvl8pPr>
+            <a:lvl9pPr marL="2130552" indent="-182880" algn="l" rtl="0" eaLnBrk="1" latinLnBrk="0" hangingPunct="1">
+              <a:lnSpc>
+                <a:spcPct val="100000"/>
+              </a:lnSpc>
+              <a:spcBef>
+                <a:spcPct val="20000"/>
+              </a:spcBef>
+              <a:buClr>
+                <a:schemeClr val="accent6"/>
+              </a:buClr>
+              <a:buFont typeface="Wingdings 2"/>
+              <a:buChar char=""/>
+              <a:defRPr kumimoji="0" sz="2000" kern="1200">
+                <a:solidFill>
+                  <a:schemeClr val="tx1"/>
+                </a:solidFill>
+                <a:latin typeface="+mn-lt"/>
+                <a:ea typeface="+mn-ea"/>
+                <a:cs typeface="+mn-cs"/>
+              </a:defRPr>
+            </a:lvl9pPr>
+            <a:extLst/>
+          </a:lstStyle>
           <a:p>
             <a:pPr marL="82296" indent="0" algn="just">
+              <a:buFont typeface="Wingdings 2"/>
               <a:buNone/>
             </a:pPr>
             <a:r>
-              <a:rPr lang="es-ES" dirty="0"/>
-              <a:t>Política de planificación:</a:t>
+              <a:rPr lang="es-ES" sz="2400" dirty="0"/>
+              <a:t>Arrancamos el clonado del contenedor y ejecutamos los dos.</a:t>
             </a:r>
           </a:p>
           <a:p>
             <a:pPr marL="82296" indent="0" algn="just">
+              <a:buFont typeface="Wingdings 2"/>
               <a:buNone/>
             </a:pPr>
             <a:r>
-              <a:rPr lang="es-ES" sz="2400" dirty="0"/>
-              <a:t>Utilizando </a:t>
-            </a:r>
-            <a:r>
-              <a:rPr lang="es-ES" sz="2400" dirty="0" err="1"/>
-              <a:t>cgroups</a:t>
-            </a:r>
-            <a:r>
-              <a:rPr lang="es-ES" sz="2400" dirty="0"/>
-              <a:t> podemos planificar un conjunto de procesos, en nuestro caso la configuración para nuestro contenedor estará en:</a:t>
-            </a:r>
+              <a:rPr lang="es-ES" sz="1400" dirty="0"/>
+              <a:t>Planificamos 	Contenedor A: 1-3 </a:t>
+            </a:r>
+            <a:r>
+              <a:rPr lang="es-ES" sz="1400" dirty="0" err="1"/>
+              <a:t>Cpus</a:t>
+            </a:r>
+            <a:r>
+              <a:rPr lang="es-ES" sz="1400" dirty="0"/>
+              <a:t>  Contenedor B: 1Cpu  (74,5%)</a:t>
+            </a:r>
+            <a:endParaRPr lang="es-ES" sz="2400" dirty="0"/>
           </a:p>
           <a:p>
             <a:pPr marL="82296" indent="0" algn="just">
+              <a:buFont typeface="Wingdings 2"/>
               <a:buNone/>
             </a:pPr>
-            <a:endParaRPr lang="es-ES" dirty="0"/>
-          </a:p>
-          <a:p>
-            <a:pPr marL="82296" indent="0" algn="just">
-              <a:buNone/>
-            </a:pPr>
-            <a:r>
-              <a:rPr lang="en-US" b="1" dirty="0"/>
-              <a:t>/sys/fs/</a:t>
-            </a:r>
-            <a:r>
-              <a:rPr lang="en-US" b="1" dirty="0" err="1"/>
-              <a:t>cgroup</a:t>
-            </a:r>
-            <a:r>
-              <a:rPr lang="en-US" b="1" dirty="0"/>
-              <a:t>/</a:t>
-            </a:r>
-            <a:r>
-              <a:rPr lang="en-US" b="1" dirty="0" err="1"/>
-              <a:t>lxc</a:t>
-            </a:r>
-            <a:r>
-              <a:rPr lang="en-US" b="1" dirty="0"/>
-              <a:t>/</a:t>
-            </a:r>
-            <a:r>
-              <a:rPr lang="en-US" b="1" dirty="0" err="1"/>
-              <a:t>my_contenedor</a:t>
-            </a:r>
-            <a:r>
-              <a:rPr lang="en-US" b="1" dirty="0"/>
-              <a:t>/</a:t>
-            </a:r>
-            <a:endParaRPr lang="es-ES" dirty="0"/>
+            <a:endParaRPr lang="es-ES" sz="2400" dirty="0"/>
           </a:p>
         </p:txBody>
       </p:sp>
+      <p:graphicFrame>
+        <p:nvGraphicFramePr>
+          <p:cNvPr id="5" name="Chart 4">
+            <a:extLst/>
+          </p:cNvPr>
+          <p:cNvGraphicFramePr>
+            <a:graphicFrameLocks/>
+          </p:cNvGraphicFramePr>
+          <p:nvPr>
+            <p:extLst>
+              <p:ext uri="{D42A27DB-BD31-4B8C-83A1-F6EECF244321}">
+                <p14:modId xmlns:p14="http://schemas.microsoft.com/office/powerpoint/2010/main" val="1072240761"/>
+              </p:ext>
+            </p:extLst>
+          </p:nvPr>
+        </p:nvGraphicFramePr>
+        <p:xfrm>
+          <a:off x="1422201" y="2348880"/>
+          <a:ext cx="7492150" cy="4248472"/>
+        </p:xfrm>
+        <a:graphic>
+          <a:graphicData uri="http://schemas.openxmlformats.org/drawingml/2006/chart">
+            <c:chart xmlns:c="http://schemas.openxmlformats.org/drawingml/2006/chart" xmlns:r="http://schemas.openxmlformats.org/officeDocument/2006/relationships" r:id="rId2"/>
+          </a:graphicData>
+        </a:graphic>
+      </p:graphicFrame>
     </p:spTree>
     <p:extLst>
       <p:ext uri="{BB962C8B-B14F-4D97-AF65-F5344CB8AC3E}">
-        <p14:creationId xmlns:p14="http://schemas.microsoft.com/office/powerpoint/2010/main" val="2569202897"/>
+        <p14:creationId xmlns:p14="http://schemas.microsoft.com/office/powerpoint/2010/main" val="1814843346"/>
       </p:ext>
     </p:extLst>
   </p:cSld>

</xml_diff>